<commit_message>
add thread executor base
</commit_message>
<xml_diff>
--- a/doc/thor architecture.pptx
+++ b/doc/thor architecture.pptx
@@ -19,8 +19,9 @@
     <p:sldId id="271" r:id="rId13"/>
     <p:sldId id="268" r:id="rId14"/>
     <p:sldId id="267" r:id="rId15"/>
-    <p:sldId id="263" r:id="rId16"/>
-    <p:sldId id="264" r:id="rId17"/>
+    <p:sldId id="272" r:id="rId16"/>
+    <p:sldId id="263" r:id="rId17"/>
+    <p:sldId id="264" r:id="rId18"/>
   </p:sldIdLst>
   <p:sldSz cx="12192000" cy="6858000"/>
   <p:notesSz cx="6858000" cy="9144000"/>
@@ -258,7 +259,7 @@
           <a:p>
             <a:fld id="{26E5557C-EA97-4CBB-BFBF-8E388EEF4F51}" type="datetimeFigureOut">
               <a:rPr lang="zh-CN" altLang="en-US" smtClean="0"/>
-              <a:t>2014/10/4</a:t>
+              <a:t>2014/10/5</a:t>
             </a:fld>
             <a:endParaRPr lang="zh-CN" altLang="en-US"/>
           </a:p>
@@ -428,7 +429,7 @@
           <a:p>
             <a:fld id="{26E5557C-EA97-4CBB-BFBF-8E388EEF4F51}" type="datetimeFigureOut">
               <a:rPr lang="zh-CN" altLang="en-US" smtClean="0"/>
-              <a:t>2014/10/4</a:t>
+              <a:t>2014/10/5</a:t>
             </a:fld>
             <a:endParaRPr lang="zh-CN" altLang="en-US"/>
           </a:p>
@@ -608,7 +609,7 @@
           <a:p>
             <a:fld id="{26E5557C-EA97-4CBB-BFBF-8E388EEF4F51}" type="datetimeFigureOut">
               <a:rPr lang="zh-CN" altLang="en-US" smtClean="0"/>
-              <a:t>2014/10/4</a:t>
+              <a:t>2014/10/5</a:t>
             </a:fld>
             <a:endParaRPr lang="zh-CN" altLang="en-US"/>
           </a:p>
@@ -778,7 +779,7 @@
           <a:p>
             <a:fld id="{26E5557C-EA97-4CBB-BFBF-8E388EEF4F51}" type="datetimeFigureOut">
               <a:rPr lang="zh-CN" altLang="en-US" smtClean="0"/>
-              <a:t>2014/10/4</a:t>
+              <a:t>2014/10/5</a:t>
             </a:fld>
             <a:endParaRPr lang="zh-CN" altLang="en-US"/>
           </a:p>
@@ -1024,7 +1025,7 @@
           <a:p>
             <a:fld id="{26E5557C-EA97-4CBB-BFBF-8E388EEF4F51}" type="datetimeFigureOut">
               <a:rPr lang="zh-CN" altLang="en-US" smtClean="0"/>
-              <a:t>2014/10/4</a:t>
+              <a:t>2014/10/5</a:t>
             </a:fld>
             <a:endParaRPr lang="zh-CN" altLang="en-US"/>
           </a:p>
@@ -1256,7 +1257,7 @@
           <a:p>
             <a:fld id="{26E5557C-EA97-4CBB-BFBF-8E388EEF4F51}" type="datetimeFigureOut">
               <a:rPr lang="zh-CN" altLang="en-US" smtClean="0"/>
-              <a:t>2014/10/4</a:t>
+              <a:t>2014/10/5</a:t>
             </a:fld>
             <a:endParaRPr lang="zh-CN" altLang="en-US"/>
           </a:p>
@@ -1623,7 +1624,7 @@
           <a:p>
             <a:fld id="{26E5557C-EA97-4CBB-BFBF-8E388EEF4F51}" type="datetimeFigureOut">
               <a:rPr lang="zh-CN" altLang="en-US" smtClean="0"/>
-              <a:t>2014/10/4</a:t>
+              <a:t>2014/10/5</a:t>
             </a:fld>
             <a:endParaRPr lang="zh-CN" altLang="en-US"/>
           </a:p>
@@ -1746,7 +1747,7 @@
           <a:p>
             <a:fld id="{26E5557C-EA97-4CBB-BFBF-8E388EEF4F51}" type="datetimeFigureOut">
               <a:rPr lang="zh-CN" altLang="en-US" smtClean="0"/>
-              <a:t>2014/10/4</a:t>
+              <a:t>2014/10/5</a:t>
             </a:fld>
             <a:endParaRPr lang="zh-CN" altLang="en-US"/>
           </a:p>
@@ -1841,7 +1842,7 @@
           <a:p>
             <a:fld id="{26E5557C-EA97-4CBB-BFBF-8E388EEF4F51}" type="datetimeFigureOut">
               <a:rPr lang="zh-CN" altLang="en-US" smtClean="0"/>
-              <a:t>2014/10/4</a:t>
+              <a:t>2014/10/5</a:t>
             </a:fld>
             <a:endParaRPr lang="zh-CN" altLang="en-US"/>
           </a:p>
@@ -2118,7 +2119,7 @@
           <a:p>
             <a:fld id="{26E5557C-EA97-4CBB-BFBF-8E388EEF4F51}" type="datetimeFigureOut">
               <a:rPr lang="zh-CN" altLang="en-US" smtClean="0"/>
-              <a:t>2014/10/4</a:t>
+              <a:t>2014/10/5</a:t>
             </a:fld>
             <a:endParaRPr lang="zh-CN" altLang="en-US"/>
           </a:p>
@@ -2375,7 +2376,7 @@
           <a:p>
             <a:fld id="{26E5557C-EA97-4CBB-BFBF-8E388EEF4F51}" type="datetimeFigureOut">
               <a:rPr lang="zh-CN" altLang="en-US" smtClean="0"/>
-              <a:t>2014/10/4</a:t>
+              <a:t>2014/10/5</a:t>
             </a:fld>
             <a:endParaRPr lang="zh-CN" altLang="en-US"/>
           </a:p>
@@ -2588,7 +2589,7 @@
           <a:p>
             <a:fld id="{26E5557C-EA97-4CBB-BFBF-8E388EEF4F51}" type="datetimeFigureOut">
               <a:rPr lang="zh-CN" altLang="en-US" smtClean="0"/>
-              <a:t>2014/10/4</a:t>
+              <a:t>2014/10/5</a:t>
             </a:fld>
             <a:endParaRPr lang="zh-CN" altLang="en-US"/>
           </a:p>
@@ -4727,7 +4728,7 @@
         <p:spPr>
           <a:xfrm>
             <a:off x="939113" y="1094874"/>
-            <a:ext cx="8263801" cy="646331"/>
+            <a:ext cx="10173646" cy="2031325"/>
           </a:xfrm>
           <a:prstGeom prst="rect">
             <a:avLst/>
@@ -4735,7 +4736,7 @@
           <a:noFill/>
         </p:spPr>
         <p:txBody>
-          <a:bodyPr wrap="none" rtlCol="0">
+          <a:bodyPr wrap="square" rtlCol="0">
             <a:spAutoFit/>
           </a:bodyPr>
           <a:lstStyle/>
@@ -4749,8 +4750,70 @@
           <a:p>
             <a:r>
               <a:rPr lang="zh-CN" altLang="en-US" dirty="0" smtClean="0"/>
-              <a:t>星型连接在实际的数据仓库中非常常见，因此需要后续考虑进行合理优化。</a:t>
-            </a:r>
+              <a:t>星型连接在实际的数据仓库中非常常见，因此需要后续考虑进行合理</a:t>
+            </a:r>
+            <a:r>
+              <a:rPr lang="zh-CN" altLang="en-US" smtClean="0"/>
+              <a:t>优化</a:t>
+            </a:r>
+            <a:r>
+              <a:rPr lang="zh-CN" altLang="en-US" smtClean="0"/>
+              <a:t>。</a:t>
+            </a:r>
+            <a:endParaRPr lang="en-US" altLang="zh-CN" smtClean="0"/>
+          </a:p>
+          <a:p>
+            <a:endParaRPr lang="en-US" altLang="zh-CN"/>
+          </a:p>
+          <a:p>
+            <a:r>
+              <a:rPr lang="zh-CN" altLang="en-US" smtClean="0"/>
+              <a:t>关于多级并行的问题，</a:t>
+            </a:r>
+            <a:r>
+              <a:rPr lang="zh-CN" altLang="en-US" smtClean="0"/>
+              <a:t>如下语句</a:t>
+            </a:r>
+            <a:endParaRPr lang="en-US" altLang="zh-CN" smtClean="0"/>
+          </a:p>
+          <a:p>
+            <a:r>
+              <a:rPr lang="en-US" altLang="zh-CN" smtClean="0"/>
+              <a:t>Select a.f1, count(a.f2) from test1 a, test2 b where a.f1=b.f1 group by a.f1;</a:t>
+            </a:r>
+          </a:p>
+          <a:p>
+            <a:r>
+              <a:rPr lang="zh-CN" altLang="en-US" smtClean="0"/>
+              <a:t>解决并行的方式是通过多级并行方式，在</a:t>
+            </a:r>
+            <a:r>
+              <a:rPr lang="en-US" altLang="zh-CN" smtClean="0"/>
+              <a:t>group</a:t>
+            </a:r>
+            <a:r>
+              <a:rPr lang="zh-CN" altLang="en-US" smtClean="0"/>
+              <a:t>和</a:t>
+            </a:r>
+            <a:r>
+              <a:rPr lang="en-US" altLang="zh-CN" smtClean="0"/>
+              <a:t>join</a:t>
+            </a:r>
+            <a:r>
+              <a:rPr lang="zh-CN" altLang="en-US" smtClean="0"/>
+              <a:t>节点增加 </a:t>
+            </a:r>
+            <a:r>
+              <a:rPr lang="en-US" altLang="zh-CN" smtClean="0"/>
+              <a:t>exchange(n&gt;m)</a:t>
+            </a:r>
+            <a:r>
+              <a:rPr lang="zh-CN" altLang="en-US" smtClean="0"/>
+              <a:t>节点</a:t>
+            </a:r>
+            <a:endParaRPr lang="en-US" altLang="zh-CN" smtClean="0"/>
+          </a:p>
+          <a:p>
             <a:endParaRPr lang="zh-CN" altLang="en-US" dirty="0"/>
           </a:p>
         </p:txBody>
@@ -5114,6 +5177,55 @@
 </file>
 
 <file path=ppt/slides/slide15.xml><?xml version="1.0" encoding="utf-8"?>
+<p:sld xmlns:a="http://schemas.openxmlformats.org/drawingml/2006/main" xmlns:r="http://schemas.openxmlformats.org/officeDocument/2006/relationships" xmlns:p="http://schemas.openxmlformats.org/presentationml/2006/main">
+  <p:cSld>
+    <p:spTree>
+      <p:nvGrpSpPr>
+        <p:cNvPr id="1" name=""/>
+        <p:cNvGrpSpPr/>
+        <p:nvPr/>
+      </p:nvGrpSpPr>
+      <p:grpSpPr>
+        <a:xfrm>
+          <a:off x="0" y="0"/>
+          <a:ext cx="0" cy="0"/>
+          <a:chOff x="0" y="0"/>
+          <a:chExt cx="0" cy="0"/>
+        </a:xfrm>
+      </p:grpSpPr>
+      <p:sp>
+        <p:nvSpPr>
+          <p:cNvPr id="4" name="标题 3"/>
+          <p:cNvSpPr>
+            <a:spLocks noGrp="1"/>
+          </p:cNvSpPr>
+          <p:nvPr>
+            <p:ph type="title"/>
+          </p:nvPr>
+        </p:nvSpPr>
+        <p:spPr/>
+        <p:txBody>
+          <a:bodyPr/>
+          <a:lstStyle/>
+          <a:p>
+            <a:endParaRPr lang="zh-CN" altLang="en-US"/>
+          </a:p>
+        </p:txBody>
+      </p:sp>
+    </p:spTree>
+    <p:extLst>
+      <p:ext uri="{BB962C8B-B14F-4D97-AF65-F5344CB8AC3E}">
+        <p14:creationId xmlns:p14="http://schemas.microsoft.com/office/powerpoint/2010/main" val="1835665518"/>
+      </p:ext>
+    </p:extLst>
+  </p:cSld>
+  <p:clrMapOvr>
+    <a:masterClrMapping/>
+  </p:clrMapOvr>
+</p:sld>
+</file>
+
+<file path=ppt/slides/slide16.xml><?xml version="1.0" encoding="utf-8"?>
 <p:sld xmlns:a="http://schemas.openxmlformats.org/drawingml/2006/main" xmlns:r="http://schemas.openxmlformats.org/officeDocument/2006/relationships" xmlns:p="http://schemas.openxmlformats.org/presentationml/2006/main">
   <p:cSld>
     <p:spTree>
@@ -7015,7 +7127,7 @@
 </p:sld>
 </file>
 
-<file path=ppt/slides/slide16.xml><?xml version="1.0" encoding="utf-8"?>
+<file path=ppt/slides/slide17.xml><?xml version="1.0" encoding="utf-8"?>
 <p:sld xmlns:a="http://schemas.openxmlformats.org/drawingml/2006/main" xmlns:r="http://schemas.openxmlformats.org/officeDocument/2006/relationships" xmlns:p="http://schemas.openxmlformats.org/presentationml/2006/main">
   <p:cSld>
     <p:spTree>

</xml_diff>